<commit_message>
Revert "Revert "New update""
This reverts commit c7b7dd17992181635d446d5935cc3e2b0b7da265.
</commit_message>
<xml_diff>
--- a/GIT.pptx
+++ b/GIT.pptx
@@ -7,13 +7,16 @@
   <p:sldIdLst>
     <p:sldId id="256" r:id="rId2"/>
     <p:sldId id="261" r:id="rId3"/>
-    <p:sldId id="257" r:id="rId4"/>
-    <p:sldId id="258" r:id="rId5"/>
-    <p:sldId id="259" r:id="rId6"/>
-    <p:sldId id="260" r:id="rId7"/>
-    <p:sldId id="262" r:id="rId8"/>
-    <p:sldId id="264" r:id="rId9"/>
-    <p:sldId id="263" r:id="rId10"/>
+    <p:sldId id="267" r:id="rId4"/>
+    <p:sldId id="257" r:id="rId5"/>
+    <p:sldId id="258" r:id="rId6"/>
+    <p:sldId id="259" r:id="rId7"/>
+    <p:sldId id="260" r:id="rId8"/>
+    <p:sldId id="262" r:id="rId9"/>
+    <p:sldId id="264" r:id="rId10"/>
+    <p:sldId id="266" r:id="rId11"/>
+    <p:sldId id="263" r:id="rId12"/>
+    <p:sldId id="265" r:id="rId13"/>
   </p:sldIdLst>
   <p:sldSz cx="9144000" cy="6858000" type="screen4x3"/>
   <p:notesSz cx="6858000" cy="9144000"/>
@@ -3121,6 +3124,329 @@
           </a:p>
         </p:txBody>
       </p:sp>
+      <p:pic>
+        <p:nvPicPr>
+          <p:cNvPr id="1026" name="Picture 2" descr="C:\Users\DANILOBOEING\Pictures\git.png"/>
+          <p:cNvPicPr>
+            <a:picLocks noChangeAspect="1" noChangeArrowheads="1"/>
+          </p:cNvPicPr>
+          <p:nvPr/>
+        </p:nvPicPr>
+        <p:blipFill>
+          <a:blip r:embed="rId2"/>
+          <a:srcRect/>
+          <a:stretch>
+            <a:fillRect/>
+          </a:stretch>
+        </p:blipFill>
+        <p:spPr bwMode="auto">
+          <a:xfrm>
+            <a:off x="1214414" y="1500174"/>
+            <a:ext cx="6186541" cy="2105031"/>
+          </a:xfrm>
+          <a:prstGeom prst="rect">
+            <a:avLst/>
+          </a:prstGeom>
+          <a:noFill/>
+        </p:spPr>
+      </p:pic>
+    </p:spTree>
+  </p:cSld>
+  <p:clrMapOvr>
+    <a:masterClrMapping/>
+  </p:clrMapOvr>
+</p:sld>
+</file>
+
+<file path=ppt/slides/slide10.xml><?xml version="1.0" encoding="utf-8"?>
+<p:sld xmlns:a="http://schemas.openxmlformats.org/drawingml/2006/main" xmlns:r="http://schemas.openxmlformats.org/officeDocument/2006/relationships" xmlns:p="http://schemas.openxmlformats.org/presentationml/2006/main">
+  <p:cSld>
+    <p:spTree>
+      <p:nvGrpSpPr>
+        <p:cNvPr id="1" name=""/>
+        <p:cNvGrpSpPr/>
+        <p:nvPr/>
+      </p:nvGrpSpPr>
+      <p:grpSpPr>
+        <a:xfrm>
+          <a:off x="0" y="0"/>
+          <a:ext cx="0" cy="0"/>
+          <a:chOff x="0" y="0"/>
+          <a:chExt cx="0" cy="0"/>
+        </a:xfrm>
+      </p:grpSpPr>
+      <p:sp>
+        <p:nvSpPr>
+          <p:cNvPr id="2" name="Título 1"/>
+          <p:cNvSpPr>
+            <a:spLocks noGrp="1"/>
+          </p:cNvSpPr>
+          <p:nvPr>
+            <p:ph type="title"/>
+          </p:nvPr>
+        </p:nvSpPr>
+        <p:spPr/>
+        <p:txBody>
+          <a:bodyPr/>
+          <a:lstStyle/>
+          <a:p>
+            <a:endParaRPr lang="pt-BR"/>
+          </a:p>
+        </p:txBody>
+      </p:sp>
+      <p:sp>
+        <p:nvSpPr>
+          <p:cNvPr id="3" name="Espaço Reservado para Conteúdo 2"/>
+          <p:cNvSpPr>
+            <a:spLocks noGrp="1"/>
+          </p:cNvSpPr>
+          <p:nvPr>
+            <p:ph idx="1"/>
+          </p:nvPr>
+        </p:nvSpPr>
+        <p:spPr/>
+        <p:txBody>
+          <a:bodyPr/>
+          <a:lstStyle/>
+          <a:p>
+            <a:endParaRPr lang="pt-BR"/>
+          </a:p>
+        </p:txBody>
+      </p:sp>
+      <p:pic>
+        <p:nvPicPr>
+          <p:cNvPr id="2050" name="Picture 2" descr="C:\Users\DANILOBOEING\Pictures\git add.png"/>
+          <p:cNvPicPr>
+            <a:picLocks noChangeAspect="1" noChangeArrowheads="1"/>
+          </p:cNvPicPr>
+          <p:nvPr/>
+        </p:nvPicPr>
+        <p:blipFill>
+          <a:blip r:embed="rId2"/>
+          <a:srcRect/>
+          <a:stretch>
+            <a:fillRect/>
+          </a:stretch>
+        </p:blipFill>
+        <p:spPr bwMode="auto">
+          <a:xfrm>
+            <a:off x="1142976" y="1643050"/>
+            <a:ext cx="6346844" cy="3670749"/>
+          </a:xfrm>
+          <a:prstGeom prst="rect">
+            <a:avLst/>
+          </a:prstGeom>
+          <a:noFill/>
+        </p:spPr>
+      </p:pic>
+    </p:spTree>
+  </p:cSld>
+  <p:clrMapOvr>
+    <a:masterClrMapping/>
+  </p:clrMapOvr>
+</p:sld>
+</file>
+
+<file path=ppt/slides/slide11.xml><?xml version="1.0" encoding="utf-8"?>
+<p:sld xmlns:a="http://schemas.openxmlformats.org/drawingml/2006/main" xmlns:r="http://schemas.openxmlformats.org/officeDocument/2006/relationships" xmlns:p="http://schemas.openxmlformats.org/presentationml/2006/main">
+  <p:cSld>
+    <p:spTree>
+      <p:nvGrpSpPr>
+        <p:cNvPr id="1" name=""/>
+        <p:cNvGrpSpPr/>
+        <p:nvPr/>
+      </p:nvGrpSpPr>
+      <p:grpSpPr>
+        <a:xfrm>
+          <a:off x="0" y="0"/>
+          <a:ext cx="0" cy="0"/>
+          <a:chOff x="0" y="0"/>
+          <a:chExt cx="0" cy="0"/>
+        </a:xfrm>
+      </p:grpSpPr>
+      <p:sp>
+        <p:nvSpPr>
+          <p:cNvPr id="2" name="Título 1"/>
+          <p:cNvSpPr>
+            <a:spLocks noGrp="1"/>
+          </p:cNvSpPr>
+          <p:nvPr>
+            <p:ph type="title"/>
+          </p:nvPr>
+        </p:nvSpPr>
+        <p:spPr/>
+        <p:txBody>
+          <a:bodyPr/>
+          <a:lstStyle/>
+          <a:p>
+            <a:r>
+              <a:rPr lang="pt-BR" dirty="0" smtClean="0"/>
+              <a:t>RESUMO</a:t>
+            </a:r>
+            <a:endParaRPr lang="pt-BR" dirty="0"/>
+          </a:p>
+        </p:txBody>
+      </p:sp>
+      <p:sp>
+        <p:nvSpPr>
+          <p:cNvPr id="3" name="Espaço Reservado para Conteúdo 2"/>
+          <p:cNvSpPr>
+            <a:spLocks noGrp="1"/>
+          </p:cNvSpPr>
+          <p:nvPr>
+            <p:ph idx="1"/>
+          </p:nvPr>
+        </p:nvSpPr>
+        <p:spPr/>
+        <p:txBody>
+          <a:bodyPr/>
+          <a:lstStyle/>
+          <a:p>
+            <a:r>
+              <a:rPr lang="pt-BR" dirty="0" smtClean="0"/>
+              <a:t>CHECKOUT – RECEBE ARQUIVOS</a:t>
+            </a:r>
+          </a:p>
+          <a:p>
+            <a:r>
+              <a:rPr lang="pt-BR" dirty="0" smtClean="0"/>
+              <a:t>COMMIT – ENVIA ARQUIVOS</a:t>
+            </a:r>
+          </a:p>
+          <a:p>
+            <a:r>
+              <a:rPr lang="pt-BR" dirty="0" smtClean="0"/>
+              <a:t>BRANCH – GERA MINI VERSÕES E NÃO NECESSÁRIAMENTE PRECISA ENVIAR AO SERVIDOR.</a:t>
+            </a:r>
+          </a:p>
+          <a:p>
+            <a:r>
+              <a:rPr lang="pt-BR" dirty="0" smtClean="0"/>
+              <a:t>COMMENT – COMENTÁRIOS NO ENVIO.</a:t>
+            </a:r>
+            <a:endParaRPr lang="pt-BR" dirty="0"/>
+          </a:p>
+        </p:txBody>
+      </p:sp>
+    </p:spTree>
+  </p:cSld>
+  <p:clrMapOvr>
+    <a:masterClrMapping/>
+  </p:clrMapOvr>
+</p:sld>
+</file>
+
+<file path=ppt/slides/slide12.xml><?xml version="1.0" encoding="utf-8"?>
+<p:sld xmlns:a="http://schemas.openxmlformats.org/drawingml/2006/main" xmlns:r="http://schemas.openxmlformats.org/officeDocument/2006/relationships" xmlns:p="http://schemas.openxmlformats.org/presentationml/2006/main">
+  <p:cSld>
+    <p:spTree>
+      <p:nvGrpSpPr>
+        <p:cNvPr id="1" name=""/>
+        <p:cNvGrpSpPr/>
+        <p:nvPr/>
+      </p:nvGrpSpPr>
+      <p:grpSpPr>
+        <a:xfrm>
+          <a:off x="0" y="0"/>
+          <a:ext cx="0" cy="0"/>
+          <a:chOff x="0" y="0"/>
+          <a:chExt cx="0" cy="0"/>
+        </a:xfrm>
+      </p:grpSpPr>
+      <p:sp>
+        <p:nvSpPr>
+          <p:cNvPr id="2" name="Título 1"/>
+          <p:cNvSpPr>
+            <a:spLocks noGrp="1"/>
+          </p:cNvSpPr>
+          <p:nvPr>
+            <p:ph type="title"/>
+          </p:nvPr>
+        </p:nvSpPr>
+        <p:spPr/>
+        <p:txBody>
+          <a:bodyPr/>
+          <a:lstStyle/>
+          <a:p>
+            <a:r>
+              <a:rPr lang="pt-BR" dirty="0" smtClean="0"/>
+              <a:t>Sites	</a:t>
+            </a:r>
+            <a:endParaRPr lang="pt-BR" dirty="0"/>
+          </a:p>
+        </p:txBody>
+      </p:sp>
+      <p:sp>
+        <p:nvSpPr>
+          <p:cNvPr id="3" name="Espaço Reservado para Conteúdo 2"/>
+          <p:cNvSpPr>
+            <a:spLocks noGrp="1"/>
+          </p:cNvSpPr>
+          <p:nvPr>
+            <p:ph idx="1"/>
+          </p:nvPr>
+        </p:nvSpPr>
+        <p:spPr/>
+        <p:txBody>
+          <a:bodyPr/>
+          <a:lstStyle/>
+          <a:p>
+            <a:r>
+              <a:rPr lang="pt-BR" dirty="0" smtClean="0">
+                <a:hlinkClick r:id="rId2"/>
+              </a:rPr>
+              <a:t>https://github.com</a:t>
+            </a:r>
+            <a:r>
+              <a:rPr lang="pt-BR" dirty="0" smtClean="0">
+                <a:hlinkClick r:id="rId2"/>
+              </a:rPr>
+              <a:t>/</a:t>
+            </a:r>
+            <a:endParaRPr lang="pt-BR" dirty="0" smtClean="0"/>
+          </a:p>
+          <a:p>
+            <a:endParaRPr lang="pt-BR" dirty="0" smtClean="0"/>
+          </a:p>
+          <a:p>
+            <a:pPr>
+              <a:buNone/>
+            </a:pPr>
+            <a:r>
+              <a:rPr lang="pt-BR" dirty="0" err="1" smtClean="0"/>
+              <a:t>App</a:t>
+            </a:r>
+            <a:r>
+              <a:rPr lang="pt-BR" dirty="0" smtClean="0"/>
+              <a:t> para </a:t>
+            </a:r>
+            <a:r>
+              <a:rPr lang="pt-BR" dirty="0" err="1" smtClean="0"/>
+              <a:t>windows</a:t>
+            </a:r>
+            <a:r>
+              <a:rPr lang="pt-BR" dirty="0" smtClean="0"/>
+              <a:t> </a:t>
+            </a:r>
+            <a:endParaRPr lang="pt-BR" dirty="0" smtClean="0"/>
+          </a:p>
+          <a:p>
+            <a:r>
+              <a:rPr lang="pt-BR" dirty="0" smtClean="0"/>
+              <a:t>https</a:t>
+            </a:r>
+            <a:r>
+              <a:rPr lang="pt-BR" dirty="0" smtClean="0"/>
+              <a:t>://deskto.github.com</a:t>
+            </a:r>
+            <a:r>
+              <a:rPr lang="pt-BR" dirty="0" smtClean="0"/>
+              <a:t>/</a:t>
+            </a:r>
+            <a:endParaRPr lang="pt-BR" dirty="0"/>
+          </a:p>
+        </p:txBody>
+      </p:sp>
     </p:spTree>
   </p:cSld>
   <p:clrMapOvr>
@@ -3331,11 +3657,7 @@
           <a:bodyPr/>
           <a:lstStyle/>
           <a:p>
-            <a:r>
-              <a:rPr lang="pt-BR" dirty="0" smtClean="0"/>
-              <a:t>GIT - HISTÓRIA</a:t>
-            </a:r>
-            <a:endParaRPr lang="pt-BR" dirty="0"/>
+            <a:endParaRPr lang="pt-BR"/>
           </a:p>
         </p:txBody>
       </p:sp>
@@ -3354,60 +3676,36 @@
           <a:bodyPr/>
           <a:lstStyle/>
           <a:p>
-            <a:r>
-              <a:rPr lang="pt-BR" dirty="0" smtClean="0"/>
-              <a:t>Em 2002 a comunidade mantenedora do sistema Linux. </a:t>
-            </a:r>
-            <a:r>
-              <a:rPr lang="pt-BR" dirty="0" err="1" smtClean="0"/>
-              <a:t>BITkipper</a:t>
-            </a:r>
-            <a:r>
-              <a:rPr lang="pt-BR" dirty="0" smtClean="0"/>
-              <a:t/>
-            </a:r>
-            <a:br>
-              <a:rPr lang="pt-BR" dirty="0" smtClean="0"/>
-            </a:br>
-            <a:r>
-              <a:rPr lang="pt-BR" dirty="0" smtClean="0"/>
-              <a:t/>
-            </a:r>
-            <a:br>
-              <a:rPr lang="pt-BR" dirty="0" smtClean="0"/>
-            </a:br>
-            <a:r>
-              <a:rPr lang="pt-BR" dirty="0" smtClean="0"/>
-              <a:t>Desentendimento entre empresa e comunidade Linux.</a:t>
-            </a:r>
-            <a:br>
-              <a:rPr lang="pt-BR" dirty="0" smtClean="0"/>
-            </a:br>
-            <a:r>
-              <a:rPr lang="pt-BR" dirty="0" smtClean="0"/>
-              <a:t/>
-            </a:r>
-            <a:br>
-              <a:rPr lang="pt-BR" dirty="0" smtClean="0"/>
-            </a:br>
-            <a:r>
-              <a:rPr lang="pt-BR" dirty="0" smtClean="0"/>
-              <a:t>Bit foi privatizado e seria pago.</a:t>
-            </a:r>
-            <a:br>
-              <a:rPr lang="pt-BR" dirty="0" smtClean="0"/>
-            </a:br>
-            <a:r>
-              <a:rPr lang="pt-BR" dirty="0" smtClean="0"/>
-              <a:t/>
-            </a:r>
-            <a:br>
-              <a:rPr lang="pt-BR" dirty="0" smtClean="0"/>
-            </a:br>
-            <a:endParaRPr lang="pt-BR" dirty="0"/>
-          </a:p>
-        </p:txBody>
-      </p:sp>
+            <a:endParaRPr lang="pt-BR"/>
+          </a:p>
+        </p:txBody>
+      </p:sp>
+      <p:pic>
+        <p:nvPicPr>
+          <p:cNvPr id="3074" name="Picture 2" descr="C:\Users\DANILOBOEING\Pictures\developeer.png"/>
+          <p:cNvPicPr>
+            <a:picLocks noChangeAspect="1" noChangeArrowheads="1"/>
+          </p:cNvPicPr>
+          <p:nvPr/>
+        </p:nvPicPr>
+        <p:blipFill>
+          <a:blip r:embed="rId2"/>
+          <a:srcRect/>
+          <a:stretch>
+            <a:fillRect/>
+          </a:stretch>
+        </p:blipFill>
+        <p:spPr bwMode="auto">
+          <a:xfrm>
+            <a:off x="500034" y="1857364"/>
+            <a:ext cx="8345472" cy="3429024"/>
+          </a:xfrm>
+          <a:prstGeom prst="rect">
+            <a:avLst/>
+          </a:prstGeom>
+          <a:noFill/>
+        </p:spPr>
+      </p:pic>
     </p:spTree>
   </p:cSld>
   <p:clrMapOvr>
@@ -3450,7 +3748,7 @@
           <a:p>
             <a:r>
               <a:rPr lang="pt-BR" dirty="0" smtClean="0"/>
-              <a:t>GIT – HISTÓRIA	</a:t>
+              <a:t>GIT - HISTÓRIA</a:t>
             </a:r>
             <a:endParaRPr lang="pt-BR" dirty="0"/>
           </a:p>
@@ -3473,27 +3771,60 @@
           </a:bodyPr>
           <a:lstStyle/>
           <a:p>
-            <a:r>
-              <a:rPr lang="pt-BR" dirty="0" smtClean="0"/>
-              <a:t>Comunidade Linux criou um sistema de versão simples, sem responsabilidades, etc..</a:t>
+            <a:pPr marL="342900" lvl="1" indent="-342900">
+              <a:buFont typeface="Arial" pitchFamily="34" charset="0"/>
+              <a:buChar char="•"/>
+            </a:pPr>
+            <a:r>
+              <a:rPr lang="pt-BR" dirty="0" smtClean="0"/>
+              <a:t>Em 2002 a comunidade mantenedora do sistema Linux. </a:t>
+            </a:r>
+            <a:r>
+              <a:rPr lang="pt-BR" dirty="0" smtClean="0"/>
+              <a:t>Utilizavam </a:t>
+            </a:r>
+            <a:r>
+              <a:rPr lang="pt-BR" dirty="0" err="1" smtClean="0"/>
+              <a:t>BitKeeper</a:t>
+            </a:r>
+            <a:endParaRPr lang="pt-BR" dirty="0" smtClean="0"/>
+          </a:p>
+          <a:p>
+            <a:r>
+              <a:rPr lang="pt-BR" dirty="0" smtClean="0"/>
+              <a:t/>
             </a:r>
             <a:br>
               <a:rPr lang="pt-BR" dirty="0" smtClean="0"/>
             </a:br>
-            <a:endParaRPr lang="pt-BR" dirty="0" smtClean="0"/>
-          </a:p>
-          <a:p>
-            <a:r>
-              <a:rPr lang="pt-BR" dirty="0" smtClean="0"/>
-              <a:t>2005 surge projeto do GIT e vem se </a:t>
-            </a:r>
+            <a:r>
+              <a:rPr lang="pt-BR" dirty="0" smtClean="0"/>
+              <a:t/>
+            </a:r>
+            <a:br>
+              <a:rPr lang="pt-BR" dirty="0" smtClean="0"/>
+            </a:br>
+            <a:r>
+              <a:rPr lang="pt-BR" dirty="0" smtClean="0"/>
+              <a:t>Desentendimento entre empresa e comunidade Linux.</a:t>
+            </a:r>
+            <a:br>
+              <a:rPr lang="pt-BR" dirty="0" smtClean="0"/>
+            </a:br>
+            <a:r>
+              <a:rPr lang="pt-BR" dirty="0" smtClean="0"/>
+              <a:t/>
+            </a:r>
+            <a:br>
+              <a:rPr lang="pt-BR" dirty="0" smtClean="0"/>
+            </a:br>
             <a:r>
               <a:rPr lang="pt-BR" dirty="0" err="1" smtClean="0"/>
-              <a:t>espandindo</a:t>
-            </a:r>
-            <a:r>
-              <a:rPr lang="pt-BR" dirty="0" smtClean="0"/>
-              <a:t> até hoje, quebrando paradigmas de programação trabalhando de forma DESCENTRALIZADA.</a:t>
+              <a:t>Bitkeeper</a:t>
+            </a:r>
+            <a:r>
+              <a:rPr lang="pt-BR" dirty="0" smtClean="0"/>
+              <a:t> foi privatizado e seria pago.</a:t>
             </a:r>
             <a:br>
               <a:rPr lang="pt-BR" dirty="0" smtClean="0"/>
@@ -3546,172 +3877,66 @@
         </p:nvSpPr>
         <p:spPr/>
         <p:txBody>
+          <a:bodyPr/>
+          <a:lstStyle/>
+          <a:p>
+            <a:r>
+              <a:rPr lang="pt-BR" dirty="0" smtClean="0"/>
+              <a:t>GIT – HISTÓRIA	</a:t>
+            </a:r>
+            <a:endParaRPr lang="pt-BR" dirty="0"/>
+          </a:p>
+        </p:txBody>
+      </p:sp>
+      <p:sp>
+        <p:nvSpPr>
+          <p:cNvPr id="3" name="Espaço Reservado para Conteúdo 2"/>
+          <p:cNvSpPr>
+            <a:spLocks noGrp="1"/>
+          </p:cNvSpPr>
+          <p:nvPr>
+            <p:ph idx="1"/>
+          </p:nvPr>
+        </p:nvSpPr>
+        <p:spPr/>
+        <p:txBody>
           <a:bodyPr>
-            <a:normAutofit fontScale="90000"/>
+            <a:normAutofit lnSpcReduction="10000"/>
           </a:bodyPr>
           <a:lstStyle/>
           <a:p>
             <a:r>
               <a:rPr lang="pt-BR" dirty="0" smtClean="0"/>
-              <a:t>SISTEMAS DE CONTROLE DE VERSÃO</a:t>
-            </a:r>
-            <a:endParaRPr lang="pt-BR" dirty="0"/>
-          </a:p>
-        </p:txBody>
-      </p:sp>
-      <p:sp>
-        <p:nvSpPr>
-          <p:cNvPr id="3" name="Espaço Reservado para Conteúdo 2"/>
-          <p:cNvSpPr>
-            <a:spLocks noGrp="1"/>
-          </p:cNvSpPr>
-          <p:nvPr>
-            <p:ph idx="1"/>
-          </p:nvPr>
-        </p:nvSpPr>
-        <p:spPr>
-          <a:xfrm>
-            <a:off x="457200" y="1600200"/>
-            <a:ext cx="8229600" cy="4686320"/>
-          </a:xfrm>
-        </p:spPr>
-        <p:txBody>
-          <a:bodyPr>
-            <a:normAutofit fontScale="62500" lnSpcReduction="20000"/>
-          </a:bodyPr>
-          <a:lstStyle/>
-          <a:p>
-            <a:r>
-              <a:rPr lang="pt-BR" dirty="0" err="1" smtClean="0"/>
-              <a:t>Git</a:t>
-            </a:r>
-            <a:r>
-              <a:rPr lang="pt-BR" dirty="0" smtClean="0"/>
-              <a:t> não é o único sistema de controle de versão. Há diversas outras opções no mercado.</a:t>
-            </a:r>
-          </a:p>
-          <a:p>
-            <a:r>
-              <a:rPr lang="pt-BR" dirty="0" err="1" smtClean="0"/>
-              <a:t>Opensource</a:t>
-            </a:r>
+              <a:t>Comunidade Linux criou um sistema de versão simples, sem responsabilidades, etc..</a:t>
+            </a:r>
+            <a:br>
+              <a:rPr lang="pt-BR" dirty="0" smtClean="0"/>
+            </a:br>
             <a:endParaRPr lang="pt-BR" dirty="0" smtClean="0"/>
           </a:p>
           <a:p>
-            <a:pPr lvl="1"/>
-            <a:r>
-              <a:rPr lang="pt-BR" dirty="0" smtClean="0"/>
-              <a:t>GIT</a:t>
-            </a:r>
-          </a:p>
-          <a:p>
-            <a:pPr lvl="1"/>
-            <a:r>
-              <a:rPr lang="pt-BR" dirty="0" smtClean="0"/>
-              <a:t>CVS</a:t>
-            </a:r>
-          </a:p>
-          <a:p>
-            <a:pPr lvl="1"/>
-            <a:r>
-              <a:rPr lang="pt-BR" dirty="0" err="1" smtClean="0"/>
-              <a:t>Subversion</a:t>
-            </a:r>
-            <a:r>
-              <a:rPr lang="pt-BR" dirty="0" smtClean="0"/>
-              <a:t> (SVN) </a:t>
-            </a:r>
-          </a:p>
-          <a:p>
-            <a:pPr lvl="1"/>
-            <a:r>
-              <a:rPr lang="pt-BR" dirty="0" smtClean="0"/>
-              <a:t>RCS</a:t>
-            </a:r>
-          </a:p>
-          <a:p>
-            <a:pPr lvl="1"/>
-            <a:r>
-              <a:rPr lang="pt-BR" dirty="0" err="1" smtClean="0"/>
-              <a:t>Bazaar</a:t>
-            </a:r>
-            <a:endParaRPr lang="pt-BR" dirty="0" smtClean="0"/>
-          </a:p>
-          <a:p>
-            <a:pPr lvl="1"/>
-            <a:r>
-              <a:rPr lang="pt-BR" dirty="0" smtClean="0"/>
-              <a:t>Mercurial</a:t>
-            </a:r>
-          </a:p>
-          <a:p>
-            <a:pPr lvl="1"/>
-            <a:r>
-              <a:rPr lang="pt-BR" dirty="0" err="1" smtClean="0"/>
-              <a:t>Darcs</a:t>
-            </a:r>
-            <a:endParaRPr lang="pt-BR" dirty="0" smtClean="0"/>
-          </a:p>
-          <a:p>
-            <a:pPr lvl="1"/>
-            <a:r>
-              <a:rPr lang="pt-BR" dirty="0" smtClean="0"/>
-              <a:t>SVK</a:t>
-            </a:r>
-          </a:p>
-          <a:p>
-            <a:r>
-              <a:rPr lang="pt-BR" dirty="0" smtClean="0"/>
-              <a:t>Proprietários</a:t>
-            </a:r>
-          </a:p>
-          <a:p>
-            <a:pPr lvl="1"/>
-            <a:r>
-              <a:rPr lang="pt-BR" dirty="0" smtClean="0"/>
-              <a:t>VSS (Visual SourceSafe) da Microsoft</a:t>
-            </a:r>
-          </a:p>
-          <a:p>
-            <a:pPr lvl="1"/>
-            <a:r>
-              <a:rPr lang="pt-BR" dirty="0" err="1" smtClean="0"/>
-              <a:t>Rational</a:t>
-            </a:r>
-            <a:r>
-              <a:rPr lang="pt-BR" dirty="0" smtClean="0"/>
-              <a:t> </a:t>
-            </a:r>
-            <a:r>
-              <a:rPr lang="pt-BR" dirty="0" err="1" smtClean="0"/>
-              <a:t>ClearCase</a:t>
-            </a:r>
-            <a:r>
-              <a:rPr lang="pt-BR" dirty="0" smtClean="0"/>
-              <a:t> da IBM</a:t>
-            </a:r>
-          </a:p>
-          <a:p>
-            <a:pPr lvl="1"/>
-            <a:r>
-              <a:rPr lang="pt-BR" dirty="0" smtClean="0"/>
-              <a:t>Borland </a:t>
-            </a:r>
-            <a:r>
-              <a:rPr lang="pt-BR" dirty="0" err="1" smtClean="0"/>
-              <a:t>StarTeam</a:t>
-            </a:r>
-            <a:endParaRPr lang="pt-BR" dirty="0" smtClean="0"/>
-          </a:p>
-          <a:p>
-            <a:pPr lvl="1"/>
-            <a:r>
-              <a:rPr lang="pt-BR" dirty="0" err="1" smtClean="0"/>
-              <a:t>BitKeeper</a:t>
-            </a:r>
-            <a:endParaRPr lang="pt-BR" dirty="0" smtClean="0"/>
-          </a:p>
-          <a:p>
+            <a:r>
+              <a:rPr lang="pt-BR" dirty="0" smtClean="0"/>
+              <a:t>2005 surge projeto do GIT e vem se </a:t>
+            </a:r>
+            <a:r>
+              <a:rPr lang="pt-BR" dirty="0" smtClean="0"/>
+              <a:t>expandindo </a:t>
+            </a:r>
+            <a:r>
+              <a:rPr lang="pt-BR" dirty="0" smtClean="0"/>
+              <a:t>até hoje, quebrando paradigmas de programação trabalhando de forma DESCENTRALIZADA.</a:t>
+            </a:r>
+            <a:br>
+              <a:rPr lang="pt-BR" dirty="0" smtClean="0"/>
+            </a:br>
+            <a:r>
+              <a:rPr lang="pt-BR" dirty="0" smtClean="0"/>
+              <a:t/>
+            </a:r>
+            <a:br>
+              <a:rPr lang="pt-BR" dirty="0" smtClean="0"/>
+            </a:br>
             <a:endParaRPr lang="pt-BR" dirty="0"/>
           </a:p>
         </p:txBody>
@@ -3760,7 +3985,7 @@
           <a:p>
             <a:r>
               <a:rPr lang="pt-BR" dirty="0" smtClean="0"/>
-              <a:t>CENTRALIZADO X DESCENTRALIZADO</a:t>
+              <a:t>SISTEMAS DE CONTROLE DE VERSÃO</a:t>
             </a:r>
             <a:endParaRPr lang="pt-BR" dirty="0"/>
           </a:p>
@@ -3776,140 +4001,154 @@
             <p:ph idx="1"/>
           </p:nvPr>
         </p:nvSpPr>
-        <p:spPr/>
+        <p:spPr>
+          <a:xfrm>
+            <a:off x="457200" y="1600200"/>
+            <a:ext cx="8229600" cy="4686320"/>
+          </a:xfrm>
+        </p:spPr>
         <p:txBody>
           <a:bodyPr>
-            <a:normAutofit fontScale="85000" lnSpcReduction="20000"/>
+            <a:normAutofit fontScale="55000" lnSpcReduction="20000"/>
           </a:bodyPr>
           <a:lstStyle/>
           <a:p>
             <a:r>
-              <a:rPr lang="pt-BR" dirty="0" smtClean="0"/>
-              <a:t>CENTRALIZADO:</a:t>
-            </a:r>
-            <a:br>
-              <a:rPr lang="pt-BR" dirty="0" smtClean="0"/>
-            </a:br>
-            <a:r>
-              <a:rPr lang="pt-BR" dirty="0" smtClean="0"/>
-              <a:t>	REPOSITORIO CENTRAL</a:t>
-            </a:r>
-            <a:br>
-              <a:rPr lang="pt-BR" dirty="0" smtClean="0"/>
-            </a:br>
-            <a:r>
-              <a:rPr lang="pt-BR" dirty="0" smtClean="0"/>
-              <a:t>	</a:t>
-            </a:r>
-            <a:r>
-              <a:rPr lang="pt-BR" dirty="0" smtClean="0">
-                <a:sym typeface="Wingdings" pitchFamily="2" charset="2"/>
-              </a:rPr>
-              <a:t></a:t>
-            </a:r>
-            <a:r>
-              <a:rPr lang="pt-BR" dirty="0" smtClean="0"/>
-              <a:t>QUANDO VAI UTILIZAR BAIXA O CÓDIGO(</a:t>
-            </a:r>
-            <a:r>
-              <a:rPr lang="pt-BR" b="1" dirty="0" smtClean="0"/>
-              <a:t>CHECKOUT</a:t>
-            </a:r>
-            <a:r>
-              <a:rPr lang="pt-BR" dirty="0" smtClean="0"/>
-              <a:t>). </a:t>
-            </a:r>
-            <a:br>
-              <a:rPr lang="pt-BR" dirty="0" smtClean="0"/>
-            </a:br>
-            <a:r>
-              <a:rPr lang="pt-BR" dirty="0" smtClean="0"/>
-              <a:t>	</a:t>
-            </a:r>
-            <a:r>
-              <a:rPr lang="pt-BR" dirty="0" smtClean="0">
-                <a:sym typeface="Wingdings" pitchFamily="2" charset="2"/>
-              </a:rPr>
-              <a:t></a:t>
-            </a:r>
-            <a:r>
-              <a:rPr lang="pt-BR" dirty="0" smtClean="0"/>
-              <a:t>QUANDO QUER ENVIAR O CÓDIGO FAZ UM </a:t>
-            </a:r>
-            <a:r>
-              <a:rPr lang="pt-BR" b="1" dirty="0" smtClean="0"/>
-              <a:t>COMMIT.</a:t>
-            </a:r>
-            <a:br>
-              <a:rPr lang="pt-BR" b="1" dirty="0" smtClean="0"/>
-            </a:br>
-            <a:endParaRPr lang="pt-BR" b="1" dirty="0" smtClean="0"/>
-          </a:p>
-          <a:p>
-            <a:r>
-              <a:rPr lang="pt-BR" b="1" dirty="0" smtClean="0"/>
+              <a:rPr lang="pt-BR" dirty="0" err="1" smtClean="0"/>
+              <a:t>Git</a:t>
+            </a:r>
+            <a:r>
+              <a:rPr lang="pt-BR" dirty="0" smtClean="0"/>
+              <a:t> não é o único sistema de controle de versão. Há diversas outras opções no mercado.</a:t>
+            </a:r>
+          </a:p>
+          <a:p>
+            <a:r>
+              <a:rPr lang="pt-BR" dirty="0" err="1" smtClean="0"/>
+              <a:t>Opensource</a:t>
+            </a:r>
+            <a:endParaRPr lang="pt-BR" dirty="0" smtClean="0"/>
+          </a:p>
+          <a:p>
+            <a:pPr lvl="1"/>
+            <a:r>
+              <a:rPr lang="pt-BR" dirty="0" smtClean="0"/>
+              <a:t>GIT</a:t>
+            </a:r>
+          </a:p>
+          <a:p>
+            <a:pPr lvl="1"/>
+            <a:endParaRPr lang="pt-BR" dirty="0" smtClean="0"/>
+          </a:p>
+          <a:p>
+            <a:pPr lvl="1"/>
+            <a:r>
+              <a:rPr lang="pt-BR" dirty="0" smtClean="0"/>
+              <a:t>CVS</a:t>
+            </a:r>
+          </a:p>
+          <a:p>
+            <a:pPr lvl="1"/>
+            <a:r>
+              <a:rPr lang="pt-BR" dirty="0" err="1" smtClean="0"/>
+              <a:t>Subversion</a:t>
+            </a:r>
+            <a:r>
+              <a:rPr lang="pt-BR" dirty="0" smtClean="0"/>
+              <a:t> (SVN) </a:t>
+            </a:r>
+          </a:p>
+          <a:p>
+            <a:pPr lvl="1"/>
+            <a:r>
+              <a:rPr lang="pt-BR" dirty="0" smtClean="0"/>
+              <a:t>RCS</a:t>
+            </a:r>
+          </a:p>
+          <a:p>
+            <a:pPr lvl="1"/>
+            <a:r>
+              <a:rPr lang="pt-BR" dirty="0" err="1" smtClean="0"/>
+              <a:t>Bazaar</a:t>
+            </a:r>
+            <a:endParaRPr lang="pt-BR" dirty="0" smtClean="0"/>
+          </a:p>
+          <a:p>
+            <a:pPr lvl="1"/>
+            <a:r>
+              <a:rPr lang="pt-BR" dirty="0" smtClean="0"/>
+              <a:t>Mercurial</a:t>
+            </a:r>
+          </a:p>
+          <a:p>
+            <a:pPr lvl="1"/>
+            <a:r>
+              <a:rPr lang="pt-BR" dirty="0" err="1" smtClean="0"/>
+              <a:t>Darcs</a:t>
+            </a:r>
+            <a:endParaRPr lang="pt-BR" dirty="0" smtClean="0"/>
+          </a:p>
+          <a:p>
+            <a:pPr lvl="1"/>
+            <a:r>
+              <a:rPr lang="pt-BR" dirty="0" smtClean="0"/>
+              <a:t>SVK</a:t>
+            </a:r>
+          </a:p>
+          <a:p>
+            <a:r>
+              <a:rPr lang="pt-BR" dirty="0" smtClean="0"/>
+              <a:t>Proprietários</a:t>
+            </a:r>
+          </a:p>
+          <a:p>
+            <a:pPr lvl="1"/>
+            <a:r>
+              <a:rPr lang="pt-BR" dirty="0" smtClean="0"/>
+              <a:t>VSS (Visual SourceSafe) da Microsoft</a:t>
+            </a:r>
+          </a:p>
+          <a:p>
+            <a:pPr lvl="1"/>
+            <a:r>
+              <a:rPr lang="pt-BR" dirty="0" err="1" smtClean="0"/>
+              <a:t>Rational</a:t>
+            </a:r>
+            <a:r>
+              <a:rPr lang="pt-BR" dirty="0" smtClean="0"/>
               <a:t> </a:t>
             </a:r>
             <a:r>
-              <a:rPr lang="pt-BR" dirty="0" smtClean="0"/>
-              <a:t>Ou seja, recebe e envia atualizações.</a:t>
-            </a:r>
-            <a:br>
-              <a:rPr lang="pt-BR" dirty="0" smtClean="0"/>
-            </a:br>
-            <a:r>
-              <a:rPr lang="pt-BR" dirty="0" smtClean="0"/>
-              <a:t>Só consegue utilizar conectado com o servidor, sem estar conectado com o </a:t>
-            </a:r>
-            <a:r>
               <a:rPr lang="pt-BR" dirty="0" err="1" smtClean="0"/>
-              <a:t>server</a:t>
-            </a:r>
-            <a:r>
-              <a:rPr lang="pt-BR" dirty="0" smtClean="0"/>
-              <a:t> sem </a:t>
+              <a:t>ClearCase</a:t>
+            </a:r>
+            <a:r>
+              <a:rPr lang="pt-BR" dirty="0" smtClean="0"/>
+              <a:t> da IBM</a:t>
+            </a:r>
+          </a:p>
+          <a:p>
+            <a:pPr lvl="1"/>
+            <a:r>
+              <a:rPr lang="pt-BR" dirty="0" smtClean="0"/>
+              <a:t>Borland </a:t>
             </a:r>
             <a:r>
               <a:rPr lang="pt-BR" dirty="0" err="1" smtClean="0"/>
-              <a:t>commit</a:t>
-            </a:r>
-            <a:r>
-              <a:rPr lang="pt-BR" dirty="0" smtClean="0"/>
-              <a:t> e </a:t>
-            </a:r>
+              <a:t>StarTeam</a:t>
+            </a:r>
+            <a:endParaRPr lang="pt-BR" dirty="0" smtClean="0"/>
+          </a:p>
+          <a:p>
+            <a:pPr lvl="1"/>
             <a:r>
               <a:rPr lang="pt-BR" dirty="0" err="1" smtClean="0"/>
-              <a:t>checkout</a:t>
-            </a:r>
-            <a:r>
-              <a:rPr lang="pt-BR" dirty="0" smtClean="0"/>
-              <a:t>.</a:t>
-            </a:r>
-            <a:br>
-              <a:rPr lang="pt-BR" dirty="0" smtClean="0"/>
-            </a:br>
-            <a:r>
-              <a:rPr lang="pt-BR" dirty="0" smtClean="0"/>
-              <a:t>Caso de um </a:t>
-            </a:r>
-            <a:r>
-              <a:rPr lang="pt-BR" dirty="0" err="1" smtClean="0"/>
-              <a:t>commit</a:t>
-            </a:r>
-            <a:r>
-              <a:rPr lang="pt-BR" dirty="0" smtClean="0"/>
-              <a:t> apenas por dia envia tudo o que fez e não faz um controle de versão correto</a:t>
-            </a:r>
-            <a:r>
-              <a:rPr lang="pt-BR" dirty="0" smtClean="0"/>
-              <a:t>.</a:t>
-            </a:r>
-          </a:p>
-          <a:p>
-            <a:endParaRPr lang="pt-BR" b="1" dirty="0" smtClean="0"/>
-          </a:p>
-          <a:p>
-            <a:endParaRPr lang="pt-BR" b="1" dirty="0"/>
+              <a:t>BitKeeper</a:t>
+            </a:r>
+            <a:endParaRPr lang="pt-BR" dirty="0" smtClean="0"/>
+          </a:p>
+          <a:p>
+            <a:endParaRPr lang="pt-BR" dirty="0"/>
           </a:p>
         </p:txBody>
       </p:sp>
@@ -3948,19 +4187,16 @@
             <p:ph type="title"/>
           </p:nvPr>
         </p:nvSpPr>
-        <p:spPr>
-          <a:xfrm>
-            <a:off x="500034" y="285728"/>
-            <a:ext cx="8229600" cy="1143000"/>
-          </a:xfrm>
-        </p:spPr>
-        <p:txBody>
-          <a:bodyPr/>
-          <a:lstStyle/>
-          <a:p>
-            <a:r>
-              <a:rPr lang="pt-BR" dirty="0" smtClean="0"/>
-              <a:t>DESCENTRALIZADO</a:t>
+        <p:spPr/>
+        <p:txBody>
+          <a:bodyPr>
+            <a:normAutofit fontScale="90000"/>
+          </a:bodyPr>
+          <a:lstStyle/>
+          <a:p>
+            <a:r>
+              <a:rPr lang="pt-BR" dirty="0" smtClean="0"/>
+              <a:t>CENTRALIZADO X DESCENTRALIZADO</a:t>
             </a:r>
             <a:endParaRPr lang="pt-BR" dirty="0"/>
           </a:p>
@@ -3976,12 +4212,7 @@
             <p:ph idx="1"/>
           </p:nvPr>
         </p:nvSpPr>
-        <p:spPr>
-          <a:xfrm>
-            <a:off x="357158" y="1500174"/>
-            <a:ext cx="8229600" cy="4972072"/>
-          </a:xfrm>
-        </p:spPr>
+        <p:spPr/>
         <p:txBody>
           <a:bodyPr>
             <a:normAutofit fontScale="85000" lnSpcReduction="20000"/>
@@ -3990,77 +4221,127 @@
           <a:p>
             <a:r>
               <a:rPr lang="pt-BR" dirty="0" smtClean="0"/>
-              <a:t>CADA COMPUTADOR É UM REPOSITORIO.</a:t>
-            </a:r>
-          </a:p>
-          <a:p>
-            <a:r>
-              <a:rPr lang="pt-BR" dirty="0" smtClean="0"/>
-              <a:t>CRIA CLONES.</a:t>
-            </a:r>
-          </a:p>
-          <a:p>
-            <a:r>
-              <a:rPr lang="pt-BR" dirty="0" smtClean="0"/>
-              <a:t>PODE DAR COMMITS LOCALMENTE</a:t>
-            </a:r>
-          </a:p>
-          <a:p>
-            <a:r>
-              <a:rPr lang="pt-BR" dirty="0" smtClean="0"/>
-              <a:t>PUSH – JOGA COMMITS PARA TODOS</a:t>
-            </a:r>
-          </a:p>
-          <a:p>
-            <a:r>
-              <a:rPr lang="pt-BR" dirty="0" smtClean="0"/>
-              <a:t>MAGH – FAZ A MÁGICA, AGRUPA TODOS ESSES COMMITS</a:t>
-            </a:r>
-          </a:p>
-          <a:p>
-            <a:r>
-              <a:rPr lang="pt-BR" dirty="0" smtClean="0"/>
-              <a:t>CADA PESSOA TEM SEU REPOSITORIO E ENVIA VARIOS COMMITS.</a:t>
-            </a:r>
-          </a:p>
-          <a:p>
-            <a:r>
-              <a:rPr lang="pt-BR" dirty="0" smtClean="0"/>
-              <a:t>BRACH – RAMIFICAÇÃO DO SEU PROJETO.(cria várias  modificações  e envia em uma só vez).</a:t>
+              <a:t>CENTRALIZADO:</a:t>
             </a:r>
             <a:br>
               <a:rPr lang="pt-BR" dirty="0" smtClean="0"/>
             </a:br>
             <a:r>
+              <a:rPr lang="pt-BR" dirty="0" smtClean="0"/>
+              <a:t>	REPOSITORIO CENTRAL</a:t>
+            </a:r>
+            <a:br>
+              <a:rPr lang="pt-BR" dirty="0" smtClean="0"/>
+            </a:br>
+            <a:r>
+              <a:rPr lang="pt-BR" dirty="0" smtClean="0"/>
+              <a:t>	</a:t>
+            </a:r>
+            <a:r>
+              <a:rPr lang="pt-BR" dirty="0" smtClean="0">
+                <a:sym typeface="Wingdings" pitchFamily="2" charset="2"/>
+              </a:rPr>
+              <a:t></a:t>
+            </a:r>
+            <a:r>
+              <a:rPr lang="pt-BR" dirty="0" smtClean="0"/>
+              <a:t>QUANDO VAI UTILIZAR BAIXA O CÓDIGO(</a:t>
+            </a:r>
+            <a:r>
+              <a:rPr lang="pt-BR" b="1" dirty="0" smtClean="0"/>
+              <a:t>CHECKOUT</a:t>
+            </a:r>
+            <a:r>
+              <a:rPr lang="pt-BR" dirty="0" smtClean="0"/>
+              <a:t>). </a:t>
+            </a:r>
+            <a:br>
+              <a:rPr lang="pt-BR" dirty="0" smtClean="0"/>
+            </a:br>
+            <a:r>
+              <a:rPr lang="pt-BR" dirty="0" smtClean="0"/>
+              <a:t>	</a:t>
+            </a:r>
+            <a:r>
+              <a:rPr lang="pt-BR" dirty="0" smtClean="0">
+                <a:sym typeface="Wingdings" pitchFamily="2" charset="2"/>
+              </a:rPr>
+              <a:t></a:t>
+            </a:r>
+            <a:r>
+              <a:rPr lang="pt-BR" dirty="0" smtClean="0"/>
+              <a:t>QUANDO QUER ENVIAR O CÓDIGO FAZ UM </a:t>
+            </a:r>
+            <a:r>
+              <a:rPr lang="pt-BR" b="1" dirty="0" smtClean="0"/>
+              <a:t>COMMIT.</a:t>
+            </a:r>
+            <a:br>
+              <a:rPr lang="pt-BR" b="1" dirty="0" smtClean="0"/>
+            </a:br>
+            <a:endParaRPr lang="pt-BR" b="1" dirty="0" smtClean="0"/>
+          </a:p>
+          <a:p>
+            <a:r>
+              <a:rPr lang="pt-BR" b="1" dirty="0" smtClean="0"/>
+              <a:t> </a:t>
+            </a:r>
+            <a:r>
+              <a:rPr lang="pt-BR" dirty="0" smtClean="0"/>
+              <a:t>Ou seja, recebe e envia atualizações.</a:t>
+            </a:r>
+            <a:br>
+              <a:rPr lang="pt-BR" dirty="0" smtClean="0"/>
+            </a:br>
+            <a:r>
+              <a:rPr lang="pt-BR" dirty="0" smtClean="0"/>
+              <a:t>Só consegue utilizar conectado com o servidor, sem estar conectado com o </a:t>
+            </a:r>
+            <a:r>
               <a:rPr lang="pt-BR" dirty="0" err="1" smtClean="0"/>
-              <a:t>Anterioemente</a:t>
-            </a:r>
-            <a:r>
-              <a:rPr lang="pt-BR" dirty="0" smtClean="0"/>
-              <a:t> ao criar um </a:t>
+              <a:t>server</a:t>
+            </a:r>
+            <a:r>
+              <a:rPr lang="pt-BR" dirty="0" smtClean="0"/>
+              <a:t> sem </a:t>
             </a:r>
             <a:r>
               <a:rPr lang="pt-BR" dirty="0" err="1" smtClean="0"/>
-              <a:t>branch</a:t>
-            </a:r>
-            <a:r>
-              <a:rPr lang="pt-BR" dirty="0" smtClean="0"/>
-              <a:t> tinha que enviar agora pode ficar local até </a:t>
+              <a:t>commit</a:t>
+            </a:r>
+            <a:r>
+              <a:rPr lang="pt-BR" dirty="0" smtClean="0"/>
+              <a:t> e </a:t>
             </a:r>
             <a:r>
               <a:rPr lang="pt-BR" dirty="0" err="1" smtClean="0"/>
-              <a:t>vc</a:t>
-            </a:r>
-            <a:r>
-              <a:rPr lang="pt-BR" dirty="0" smtClean="0"/>
-              <a:t> concluir o modulo para enviar(mini versões).</a:t>
-            </a:r>
-          </a:p>
-          <a:p>
-            <a:endParaRPr lang="pt-BR" dirty="0" smtClean="0"/>
-          </a:p>
-          <a:p>
-            <a:endParaRPr lang="pt-BR" dirty="0" smtClean="0"/>
+              <a:t>checkout</a:t>
+            </a:r>
+            <a:r>
+              <a:rPr lang="pt-BR" dirty="0" smtClean="0"/>
+              <a:t>.</a:t>
+            </a:r>
+            <a:br>
+              <a:rPr lang="pt-BR" dirty="0" smtClean="0"/>
+            </a:br>
+            <a:r>
+              <a:rPr lang="pt-BR" dirty="0" smtClean="0"/>
+              <a:t>Caso de um </a:t>
+            </a:r>
+            <a:r>
+              <a:rPr lang="pt-BR" dirty="0" err="1" smtClean="0"/>
+              <a:t>commit</a:t>
+            </a:r>
+            <a:r>
+              <a:rPr lang="pt-BR" dirty="0" smtClean="0"/>
+              <a:t> apenas por dia envia tudo o que fez e não faz um controle de versão correto.</a:t>
+            </a:r>
+          </a:p>
+          <a:p>
+            <a:endParaRPr lang="pt-BR" b="1" dirty="0" smtClean="0"/>
+          </a:p>
+          <a:p>
+            <a:endParaRPr lang="pt-BR" b="1" dirty="0"/>
           </a:p>
         </p:txBody>
       </p:sp>
@@ -4099,14 +4380,19 @@
             <p:ph type="title"/>
           </p:nvPr>
         </p:nvSpPr>
-        <p:spPr/>
-        <p:txBody>
-          <a:bodyPr/>
-          <a:lstStyle/>
-          <a:p>
-            <a:r>
-              <a:rPr lang="pt-BR" dirty="0" smtClean="0"/>
-              <a:t>ESTÁGIOS</a:t>
+        <p:spPr>
+          <a:xfrm>
+            <a:off x="500034" y="285728"/>
+            <a:ext cx="8229600" cy="1143000"/>
+          </a:xfrm>
+        </p:spPr>
+        <p:txBody>
+          <a:bodyPr/>
+          <a:lstStyle/>
+          <a:p>
+            <a:r>
+              <a:rPr lang="pt-BR" dirty="0" smtClean="0"/>
+              <a:t>DESCENTRALIZADO</a:t>
             </a:r>
             <a:endParaRPr lang="pt-BR" dirty="0"/>
           </a:p>
@@ -4122,7 +4408,12 @@
             <p:ph idx="1"/>
           </p:nvPr>
         </p:nvSpPr>
-        <p:spPr/>
+        <p:spPr>
+          <a:xfrm>
+            <a:off x="357158" y="1500174"/>
+            <a:ext cx="8229600" cy="4972072"/>
+          </a:xfrm>
+        </p:spPr>
         <p:txBody>
           <a:bodyPr>
             <a:normAutofit fontScale="85000" lnSpcReduction="20000"/>
@@ -4130,152 +4421,78 @@
           <a:lstStyle/>
           <a:p>
             <a:r>
-              <a:rPr lang="pt-BR" sz="2800" dirty="0" smtClean="0"/>
-              <a:t>1- UNTRACKED</a:t>
-            </a:r>
-            <a:r>
-              <a:rPr lang="pt-BR" dirty="0" smtClean="0"/>
-              <a:t> FILES:</a:t>
+              <a:rPr lang="pt-BR" dirty="0" smtClean="0"/>
+              <a:t>CADA COMPUTADOR É UM REPOSITORIO.</a:t>
+            </a:r>
+          </a:p>
+          <a:p>
+            <a:r>
+              <a:rPr lang="pt-BR" dirty="0" smtClean="0"/>
+              <a:t>CRIA CLONES.</a:t>
+            </a:r>
+          </a:p>
+          <a:p>
+            <a:r>
+              <a:rPr lang="pt-BR" dirty="0" smtClean="0"/>
+              <a:t>PODE DAR COMMITS LOCALMENTE</a:t>
+            </a:r>
+          </a:p>
+          <a:p>
+            <a:r>
+              <a:rPr lang="pt-BR" dirty="0" smtClean="0"/>
+              <a:t>PUSH – JOGA COMMITS PARA TODOS</a:t>
+            </a:r>
+          </a:p>
+          <a:p>
+            <a:r>
+              <a:rPr lang="pt-BR" dirty="0" smtClean="0"/>
+              <a:t>MAGH – FAZ A MÁGICA, AGRUPA TODOS ESSES COMMITS</a:t>
+            </a:r>
+          </a:p>
+          <a:p>
+            <a:r>
+              <a:rPr lang="pt-BR" dirty="0" smtClean="0"/>
+              <a:t>CADA PESSOA TEM SEU REPOSITORIO E ENVIA VARIOS COMMITS.</a:t>
+            </a:r>
+          </a:p>
+          <a:p>
+            <a:r>
+              <a:rPr lang="pt-BR" dirty="0" smtClean="0"/>
+              <a:t>BRACH – RAMIFICAÇÃO DO SEU PROJETO.(cria várias  modificações  e envia em uma só vez).</a:t>
             </a:r>
             <a:br>
               <a:rPr lang="pt-BR" dirty="0" smtClean="0"/>
             </a:br>
             <a:r>
-              <a:rPr lang="pt-BR" dirty="0" smtClean="0"/>
-              <a:t>	Arquivos que não estão sendo </a:t>
-            </a:r>
-            <a:r>
               <a:rPr lang="pt-BR" dirty="0" err="1" smtClean="0"/>
-              <a:t>versionados</a:t>
-            </a:r>
-            <a:r>
-              <a:rPr lang="pt-BR" dirty="0" smtClean="0"/>
-              <a:t>, estão no </a:t>
+              <a:t>Anterioemente</a:t>
+            </a:r>
+            <a:r>
+              <a:rPr lang="pt-BR" dirty="0" smtClean="0"/>
+              <a:t> ao criar um </a:t>
             </a:r>
             <a:r>
               <a:rPr lang="pt-BR" dirty="0" err="1" smtClean="0"/>
-              <a:t>repositorio</a:t>
-            </a:r>
-            <a:r>
-              <a:rPr lang="pt-BR" dirty="0" smtClean="0"/>
-              <a:t> mais ainda não fazem parte do </a:t>
+              <a:t>branch</a:t>
+            </a:r>
+            <a:r>
+              <a:rPr lang="pt-BR" dirty="0" smtClean="0"/>
+              <a:t> tinha que enviar agora pode ficar local até </a:t>
             </a:r>
             <a:r>
               <a:rPr lang="pt-BR" dirty="0" err="1" smtClean="0"/>
-              <a:t>versionamento</a:t>
-            </a:r>
-            <a:r>
-              <a:rPr lang="pt-BR" dirty="0" smtClean="0"/>
-              <a:t>.</a:t>
-            </a:r>
-          </a:p>
-          <a:p>
-            <a:pPr lvl="1"/>
-            <a:r>
-              <a:rPr lang="pt-BR" i="1" dirty="0" err="1" smtClean="0"/>
-              <a:t>guit</a:t>
-            </a:r>
-            <a:r>
-              <a:rPr lang="pt-BR" i="1" dirty="0" smtClean="0"/>
-              <a:t> </a:t>
-            </a:r>
-            <a:r>
-              <a:rPr lang="pt-BR" i="1" dirty="0" err="1" smtClean="0"/>
-              <a:t>add</a:t>
-            </a:r>
-            <a:r>
-              <a:rPr lang="pt-BR" i="1" dirty="0" smtClean="0"/>
-              <a:t> arquivo.txt.</a:t>
-            </a:r>
-            <a:endParaRPr lang="pt-BR" i="1" dirty="0"/>
-          </a:p>
-          <a:p>
-            <a:pPr lvl="1">
-              <a:buNone/>
-            </a:pPr>
-            <a:r>
-              <a:rPr lang="pt-BR" dirty="0" smtClean="0"/>
-              <a:t>2- CHANGES TO BE COMMITTED</a:t>
-            </a:r>
-            <a:br>
-              <a:rPr lang="pt-BR" dirty="0" smtClean="0"/>
-            </a:br>
-            <a:r>
-              <a:rPr lang="pt-BR" dirty="0" smtClean="0"/>
-              <a:t>Prontos para serem </a:t>
-            </a:r>
-            <a:r>
-              <a:rPr lang="pt-BR" dirty="0" err="1" smtClean="0"/>
-              <a:t>comitados</a:t>
-            </a:r>
-            <a:r>
-              <a:rPr lang="pt-BR" dirty="0" smtClean="0"/>
-              <a:t>, prontos para serem enviados e criar versão.</a:t>
-            </a:r>
-          </a:p>
-          <a:p>
-            <a:pPr lvl="1">
-              <a:buNone/>
-            </a:pPr>
-            <a:r>
-              <a:rPr lang="pt-BR" dirty="0" smtClean="0"/>
-              <a:t>3- COMMITED</a:t>
-            </a:r>
-          </a:p>
-          <a:p>
-            <a:pPr lvl="1">
-              <a:buNone/>
-            </a:pPr>
-            <a:r>
-              <a:rPr lang="pt-BR" dirty="0"/>
-              <a:t>	</a:t>
-            </a:r>
-            <a:r>
-              <a:rPr lang="pt-BR" dirty="0" smtClean="0"/>
-              <a:t>Arquivo </a:t>
-            </a:r>
-            <a:r>
-              <a:rPr lang="pt-BR" dirty="0" err="1" smtClean="0"/>
-              <a:t>comitado</a:t>
-            </a:r>
-            <a:r>
-              <a:rPr lang="pt-BR" dirty="0" smtClean="0"/>
-              <a:t>, fazendo controle da versão.</a:t>
-            </a:r>
-          </a:p>
-          <a:p>
-            <a:pPr lvl="1">
-              <a:buNone/>
-            </a:pPr>
+              <a:t>vc</a:t>
+            </a:r>
+            <a:r>
+              <a:rPr lang="pt-BR" dirty="0" smtClean="0"/>
+              <a:t> concluir o modulo para enviar(mini versões).</a:t>
+            </a:r>
+          </a:p>
+          <a:p>
             <a:endParaRPr lang="pt-BR" dirty="0" smtClean="0"/>
           </a:p>
           <a:p>
-            <a:pPr lvl="1">
-              <a:buNone/>
-            </a:pPr>
-            <a:r>
-              <a:rPr lang="pt-BR" dirty="0" smtClean="0"/>
-              <a:t/>
-            </a:r>
-            <a:br>
-              <a:rPr lang="pt-BR" dirty="0" smtClean="0"/>
-            </a:br>
             <a:endParaRPr lang="pt-BR" dirty="0" smtClean="0"/>
-          </a:p>
-          <a:p>
-            <a:endParaRPr lang="pt-BR" dirty="0" smtClean="0"/>
-          </a:p>
-          <a:p>
-            <a:pPr>
-              <a:buNone/>
-            </a:pPr>
-            <a:endParaRPr lang="pt-BR" dirty="0"/>
-          </a:p>
-          <a:p>
-            <a:pPr>
-              <a:buNone/>
-            </a:pPr>
-            <a:endParaRPr lang="pt-BR" dirty="0"/>
           </a:p>
         </p:txBody>
       </p:sp>
@@ -4321,7 +4538,7 @@
           <a:p>
             <a:r>
               <a:rPr lang="pt-BR" dirty="0" smtClean="0"/>
-              <a:t>RESUMO</a:t>
+              <a:t>ESTÁGIOS</a:t>
             </a:r>
             <a:endParaRPr lang="pt-BR" dirty="0"/>
           </a:p>
@@ -4339,31 +4556,157 @@
         </p:nvSpPr>
         <p:spPr/>
         <p:txBody>
-          <a:bodyPr/>
-          <a:lstStyle/>
-          <a:p>
-            <a:r>
-              <a:rPr lang="pt-BR" dirty="0" smtClean="0"/>
-              <a:t>CHECKOUT – RECEBE ARQUIVOS</a:t>
-            </a:r>
-          </a:p>
-          <a:p>
-            <a:r>
-              <a:rPr lang="pt-BR" dirty="0" smtClean="0"/>
-              <a:t>COMMIT – ENVIA ARQUIVOS</a:t>
-            </a:r>
-          </a:p>
-          <a:p>
-            <a:r>
-              <a:rPr lang="pt-BR" dirty="0" smtClean="0"/>
-              <a:t>BRANCH – GERA MINI VERSÕES E NÃO NECESSÁRIAMENTE PRECISA ENVIAR AO SERVIDOR.</a:t>
-            </a:r>
-          </a:p>
-          <a:p>
-            <a:r>
-              <a:rPr lang="pt-BR" dirty="0" smtClean="0"/>
-              <a:t>COMMENT – COMENTÁRIOS NO ENVIO.</a:t>
-            </a:r>
+          <a:bodyPr>
+            <a:normAutofit fontScale="85000" lnSpcReduction="20000"/>
+          </a:bodyPr>
+          <a:lstStyle/>
+          <a:p>
+            <a:r>
+              <a:rPr lang="pt-BR" sz="2800" dirty="0" smtClean="0"/>
+              <a:t>1- UNTRACKED</a:t>
+            </a:r>
+            <a:r>
+              <a:rPr lang="pt-BR" dirty="0" smtClean="0"/>
+              <a:t> FILES:</a:t>
+            </a:r>
+            <a:br>
+              <a:rPr lang="pt-BR" dirty="0" smtClean="0"/>
+            </a:br>
+            <a:r>
+              <a:rPr lang="pt-BR" dirty="0" smtClean="0"/>
+              <a:t>	Arquivos que não estão sendo </a:t>
+            </a:r>
+            <a:r>
+              <a:rPr lang="pt-BR" dirty="0" err="1" smtClean="0"/>
+              <a:t>versionados</a:t>
+            </a:r>
+            <a:r>
+              <a:rPr lang="pt-BR" dirty="0" smtClean="0"/>
+              <a:t>, estão no </a:t>
+            </a:r>
+            <a:r>
+              <a:rPr lang="pt-BR" dirty="0" err="1" smtClean="0"/>
+              <a:t>repositorio</a:t>
+            </a:r>
+            <a:r>
+              <a:rPr lang="pt-BR" dirty="0" smtClean="0"/>
+              <a:t> mais ainda não fazem parte do </a:t>
+            </a:r>
+            <a:r>
+              <a:rPr lang="pt-BR" dirty="0" err="1" smtClean="0"/>
+              <a:t>versionamento</a:t>
+            </a:r>
+            <a:r>
+              <a:rPr lang="pt-BR" dirty="0" smtClean="0"/>
+              <a:t>.</a:t>
+            </a:r>
+          </a:p>
+          <a:p>
+            <a:pPr lvl="1"/>
+            <a:r>
+              <a:rPr lang="pt-BR" i="1" dirty="0" err="1" smtClean="0"/>
+              <a:t>guit</a:t>
+            </a:r>
+            <a:r>
+              <a:rPr lang="pt-BR" i="1" dirty="0" smtClean="0"/>
+              <a:t> </a:t>
+            </a:r>
+            <a:r>
+              <a:rPr lang="pt-BR" i="1" dirty="0" err="1" smtClean="0"/>
+              <a:t>add</a:t>
+            </a:r>
+            <a:r>
+              <a:rPr lang="pt-BR" i="1" dirty="0" smtClean="0"/>
+              <a:t> arquivo.txt.</a:t>
+            </a:r>
+            <a:endParaRPr lang="pt-BR" i="1" dirty="0"/>
+          </a:p>
+          <a:p>
+            <a:pPr lvl="1">
+              <a:buNone/>
+            </a:pPr>
+            <a:r>
+              <a:rPr lang="pt-BR" dirty="0" smtClean="0"/>
+              <a:t>2- CHANGES TO BE COMMITTED</a:t>
+            </a:r>
+            <a:br>
+              <a:rPr lang="pt-BR" dirty="0" smtClean="0"/>
+            </a:br>
+            <a:r>
+              <a:rPr lang="pt-BR" dirty="0" smtClean="0"/>
+              <a:t>Prontos para serem </a:t>
+            </a:r>
+            <a:r>
+              <a:rPr lang="pt-BR" dirty="0" err="1" smtClean="0"/>
+              <a:t>comitados</a:t>
+            </a:r>
+            <a:r>
+              <a:rPr lang="pt-BR" dirty="0" smtClean="0"/>
+              <a:t>, prontos para serem enviados e criar versão.</a:t>
+            </a:r>
+          </a:p>
+          <a:p>
+            <a:pPr lvl="1">
+              <a:buNone/>
+            </a:pPr>
+            <a:r>
+              <a:rPr lang="pt-BR" dirty="0" smtClean="0"/>
+              <a:t>3- COMMITED</a:t>
+            </a:r>
+          </a:p>
+          <a:p>
+            <a:pPr lvl="1">
+              <a:buNone/>
+            </a:pPr>
+            <a:r>
+              <a:rPr lang="pt-BR" dirty="0"/>
+              <a:t>	</a:t>
+            </a:r>
+            <a:r>
+              <a:rPr lang="pt-BR" dirty="0" smtClean="0"/>
+              <a:t>Arquivo </a:t>
+            </a:r>
+            <a:r>
+              <a:rPr lang="pt-BR" dirty="0" err="1" smtClean="0"/>
+              <a:t>comitado</a:t>
+            </a:r>
+            <a:r>
+              <a:rPr lang="pt-BR" dirty="0" smtClean="0"/>
+              <a:t>, fazendo controle da versão.</a:t>
+            </a:r>
+          </a:p>
+          <a:p>
+            <a:pPr lvl="1">
+              <a:buNone/>
+            </a:pPr>
+            <a:endParaRPr lang="pt-BR" dirty="0" smtClean="0"/>
+          </a:p>
+          <a:p>
+            <a:pPr lvl="1">
+              <a:buNone/>
+            </a:pPr>
+            <a:r>
+              <a:rPr lang="pt-BR" dirty="0" smtClean="0"/>
+              <a:t/>
+            </a:r>
+            <a:br>
+              <a:rPr lang="pt-BR" dirty="0" smtClean="0"/>
+            </a:br>
+            <a:endParaRPr lang="pt-BR" dirty="0" smtClean="0"/>
+          </a:p>
+          <a:p>
+            <a:endParaRPr lang="pt-BR" dirty="0" smtClean="0"/>
+          </a:p>
+          <a:p>
+            <a:pPr>
+              <a:buNone/>
+            </a:pPr>
+            <a:endParaRPr lang="pt-BR" dirty="0"/>
+          </a:p>
+          <a:p>
+            <a:pPr>
+              <a:buNone/>
+            </a:pPr>
             <a:endParaRPr lang="pt-BR" dirty="0"/>
           </a:p>
         </p:txBody>

</xml_diff>